<commit_message>
edit DineDesk add link in Paya
</commit_message>
<xml_diff>
--- a/assets/img/portfolio_Image.pptx
+++ b/assets/img/portfolio_Image.pptx
@@ -10,6 +10,8 @@
     <p:sldId id="258" r:id="rId4"/>
     <p:sldId id="259" r:id="rId5"/>
     <p:sldId id="260" r:id="rId6"/>
+    <p:sldId id="261" r:id="rId7"/>
+    <p:sldId id="262" r:id="rId8"/>
   </p:sldIdLst>
   <p:sldSz cx="18288000" cy="13730288"/>
   <p:notesSz cx="6858000" cy="9144000"/>
@@ -258,7 +260,7 @@
           <a:p>
             <a:fld id="{F64D9FC2-AC8E-4CBC-99FF-EB4658DAF24D}" type="datetimeFigureOut">
               <a:rPr lang="en-US" smtClean="0"/>
-              <a:t>2023/06/30</a:t>
+              <a:t>2023/07/09</a:t>
             </a:fld>
             <a:endParaRPr lang="en-US"/>
           </a:p>
@@ -428,7 +430,7 @@
           <a:p>
             <a:fld id="{F64D9FC2-AC8E-4CBC-99FF-EB4658DAF24D}" type="datetimeFigureOut">
               <a:rPr lang="en-US" smtClean="0"/>
-              <a:t>2023/06/30</a:t>
+              <a:t>2023/07/09</a:t>
             </a:fld>
             <a:endParaRPr lang="en-US"/>
           </a:p>
@@ -608,7 +610,7 @@
           <a:p>
             <a:fld id="{F64D9FC2-AC8E-4CBC-99FF-EB4658DAF24D}" type="datetimeFigureOut">
               <a:rPr lang="en-US" smtClean="0"/>
-              <a:t>2023/06/30</a:t>
+              <a:t>2023/07/09</a:t>
             </a:fld>
             <a:endParaRPr lang="en-US"/>
           </a:p>
@@ -778,7 +780,7 @@
           <a:p>
             <a:fld id="{F64D9FC2-AC8E-4CBC-99FF-EB4658DAF24D}" type="datetimeFigureOut">
               <a:rPr lang="en-US" smtClean="0"/>
-              <a:t>2023/06/30</a:t>
+              <a:t>2023/07/09</a:t>
             </a:fld>
             <a:endParaRPr lang="en-US"/>
           </a:p>
@@ -1022,7 +1024,7 @@
           <a:p>
             <a:fld id="{F64D9FC2-AC8E-4CBC-99FF-EB4658DAF24D}" type="datetimeFigureOut">
               <a:rPr lang="en-US" smtClean="0"/>
-              <a:t>2023/06/30</a:t>
+              <a:t>2023/07/09</a:t>
             </a:fld>
             <a:endParaRPr lang="en-US"/>
           </a:p>
@@ -1254,7 +1256,7 @@
           <a:p>
             <a:fld id="{F64D9FC2-AC8E-4CBC-99FF-EB4658DAF24D}" type="datetimeFigureOut">
               <a:rPr lang="en-US" smtClean="0"/>
-              <a:t>2023/06/30</a:t>
+              <a:t>2023/07/09</a:t>
             </a:fld>
             <a:endParaRPr lang="en-US"/>
           </a:p>
@@ -1621,7 +1623,7 @@
           <a:p>
             <a:fld id="{F64D9FC2-AC8E-4CBC-99FF-EB4658DAF24D}" type="datetimeFigureOut">
               <a:rPr lang="en-US" smtClean="0"/>
-              <a:t>2023/06/30</a:t>
+              <a:t>2023/07/09</a:t>
             </a:fld>
             <a:endParaRPr lang="en-US"/>
           </a:p>
@@ -1739,7 +1741,7 @@
           <a:p>
             <a:fld id="{F64D9FC2-AC8E-4CBC-99FF-EB4658DAF24D}" type="datetimeFigureOut">
               <a:rPr lang="en-US" smtClean="0"/>
-              <a:t>2023/06/30</a:t>
+              <a:t>2023/07/09</a:t>
             </a:fld>
             <a:endParaRPr lang="en-US"/>
           </a:p>
@@ -1834,7 +1836,7 @@
           <a:p>
             <a:fld id="{F64D9FC2-AC8E-4CBC-99FF-EB4658DAF24D}" type="datetimeFigureOut">
               <a:rPr lang="en-US" smtClean="0"/>
-              <a:t>2023/06/30</a:t>
+              <a:t>2023/07/09</a:t>
             </a:fld>
             <a:endParaRPr lang="en-US"/>
           </a:p>
@@ -2111,7 +2113,7 @@
           <a:p>
             <a:fld id="{F64D9FC2-AC8E-4CBC-99FF-EB4658DAF24D}" type="datetimeFigureOut">
               <a:rPr lang="en-US" smtClean="0"/>
-              <a:t>2023/06/30</a:t>
+              <a:t>2023/07/09</a:t>
             </a:fld>
             <a:endParaRPr lang="en-US"/>
           </a:p>
@@ -2368,7 +2370,7 @@
           <a:p>
             <a:fld id="{F64D9FC2-AC8E-4CBC-99FF-EB4658DAF24D}" type="datetimeFigureOut">
               <a:rPr lang="en-US" smtClean="0"/>
-              <a:t>2023/06/30</a:t>
+              <a:t>2023/07/09</a:t>
             </a:fld>
             <a:endParaRPr lang="en-US"/>
           </a:p>
@@ -2581,7 +2583,7 @@
           <a:p>
             <a:fld id="{F64D9FC2-AC8E-4CBC-99FF-EB4658DAF24D}" type="datetimeFigureOut">
               <a:rPr lang="en-US" smtClean="0"/>
-              <a:t>2023/06/30</a:t>
+              <a:t>2023/07/09</a:t>
             </a:fld>
             <a:endParaRPr lang="en-US"/>
           </a:p>
@@ -3063,8 +3065,8 @@
         </p:blipFill>
         <p:spPr>
           <a:xfrm>
-            <a:off x="329343" y="1701100"/>
-            <a:ext cx="17629313" cy="10329675"/>
+            <a:off x="1828800" y="2578894"/>
+            <a:ext cx="14630400" cy="8572500"/>
           </a:xfrm>
           <a:prstGeom prst="roundRect">
             <a:avLst>
@@ -3187,8 +3189,8 @@
         </p:blipFill>
         <p:spPr>
           <a:xfrm>
-            <a:off x="329342" y="1701100"/>
-            <a:ext cx="17629313" cy="10329676"/>
+            <a:off x="1828800" y="2579688"/>
+            <a:ext cx="14630400" cy="8572500"/>
           </a:xfrm>
           <a:prstGeom prst="roundRect">
             <a:avLst>
@@ -3568,6 +3570,255 @@
     <p:extLst>
       <p:ext uri="{BB962C8B-B14F-4D97-AF65-F5344CB8AC3E}">
         <p14:creationId xmlns:p14="http://schemas.microsoft.com/office/powerpoint/2010/main" val="625592049"/>
+      </p:ext>
+    </p:extLst>
+  </p:cSld>
+  <p:clrMapOvr>
+    <a:masterClrMapping/>
+  </p:clrMapOvr>
+</p:sld>
+</file>
+
+<file path=ppt/slides/slide6.xml><?xml version="1.0" encoding="utf-8"?>
+<p:sld xmlns:a="http://schemas.openxmlformats.org/drawingml/2006/main" xmlns:r="http://schemas.openxmlformats.org/officeDocument/2006/relationships" xmlns:p="http://schemas.openxmlformats.org/presentationml/2006/main">
+  <p:cSld>
+    <p:spTree>
+      <p:nvGrpSpPr>
+        <p:cNvPr id="1" name=""/>
+        <p:cNvGrpSpPr/>
+        <p:nvPr/>
+      </p:nvGrpSpPr>
+      <p:grpSpPr>
+        <a:xfrm>
+          <a:off x="0" y="0"/>
+          <a:ext cx="0" cy="0"/>
+          <a:chOff x="0" y="0"/>
+          <a:chExt cx="0" cy="0"/>
+        </a:xfrm>
+      </p:grpSpPr>
+      <p:pic>
+        <p:nvPicPr>
+          <p:cNvPr id="5" name="Picture 4">
+            <a:extLst>
+              <a:ext uri="{FF2B5EF4-FFF2-40B4-BE49-F238E27FC236}">
+                <a16:creationId xmlns:a16="http://schemas.microsoft.com/office/drawing/2014/main" id="{84180EBF-690B-7508-3AB7-EF7B1D333B3C}"/>
+              </a:ext>
+            </a:extLst>
+          </p:cNvPr>
+          <p:cNvPicPr>
+            <a:picLocks noChangeAspect="1"/>
+          </p:cNvPicPr>
+          <p:nvPr/>
+        </p:nvPicPr>
+        <p:blipFill>
+          <a:blip r:embed="rId2">
+            <a:extLst>
+              <a:ext uri="{28A0092B-C50C-407E-A947-70E740481C1C}">
+                <a14:useLocalDpi xmlns:a14="http://schemas.microsoft.com/office/drawing/2010/main" val="0"/>
+              </a:ext>
+            </a:extLst>
+          </a:blip>
+          <a:stretch>
+            <a:fillRect/>
+          </a:stretch>
+        </p:blipFill>
+        <p:spPr>
+          <a:xfrm>
+            <a:off x="3540313" y="2576608"/>
+            <a:ext cx="11207374" cy="8577072"/>
+          </a:xfrm>
+          <a:prstGeom prst="roundRect">
+            <a:avLst>
+              <a:gd name="adj" fmla="val 2231"/>
+            </a:avLst>
+          </a:prstGeom>
+          <a:effectLst>
+            <a:outerShdw blurRad="254000" dist="127000" dir="5400000" algn="t" rotWithShape="0">
+              <a:prstClr val="black">
+                <a:alpha val="10000"/>
+              </a:prstClr>
+            </a:outerShdw>
+          </a:effectLst>
+        </p:spPr>
+      </p:pic>
+      <p:sp>
+        <p:nvSpPr>
+          <p:cNvPr id="7" name="Rectangle 6">
+            <a:extLst>
+              <a:ext uri="{FF2B5EF4-FFF2-40B4-BE49-F238E27FC236}">
+                <a16:creationId xmlns:a16="http://schemas.microsoft.com/office/drawing/2014/main" id="{396C792A-FBD0-AC30-AF93-DFCB2A59E3BF}"/>
+              </a:ext>
+            </a:extLst>
+          </p:cNvPr>
+          <p:cNvSpPr/>
+          <p:nvPr/>
+        </p:nvSpPr>
+        <p:spPr>
+          <a:xfrm>
+            <a:off x="0" y="9183"/>
+            <a:ext cx="18288000" cy="13721105"/>
+          </a:xfrm>
+          <a:prstGeom prst="rect">
+            <a:avLst/>
+          </a:prstGeom>
+          <a:noFill/>
+          <a:ln>
+            <a:noFill/>
+          </a:ln>
+        </p:spPr>
+        <p:style>
+          <a:lnRef idx="2">
+            <a:schemeClr val="accent1">
+              <a:shade val="50000"/>
+            </a:schemeClr>
+          </a:lnRef>
+          <a:fillRef idx="1">
+            <a:schemeClr val="accent1"/>
+          </a:fillRef>
+          <a:effectRef idx="0">
+            <a:schemeClr val="accent1"/>
+          </a:effectRef>
+          <a:fontRef idx="minor">
+            <a:schemeClr val="lt1"/>
+          </a:fontRef>
+        </p:style>
+        <p:txBody>
+          <a:bodyPr rtlCol="0" anchor="ctr"/>
+          <a:lstStyle/>
+          <a:p>
+            <a:pPr algn="ctr"/>
+            <a:endParaRPr lang="en-US"/>
+          </a:p>
+        </p:txBody>
+      </p:sp>
+    </p:spTree>
+    <p:extLst>
+      <p:ext uri="{BB962C8B-B14F-4D97-AF65-F5344CB8AC3E}">
+        <p14:creationId xmlns:p14="http://schemas.microsoft.com/office/powerpoint/2010/main" val="290507532"/>
+      </p:ext>
+    </p:extLst>
+  </p:cSld>
+  <p:clrMapOvr>
+    <a:masterClrMapping/>
+  </p:clrMapOvr>
+</p:sld>
+</file>
+
+<file path=ppt/slides/slide7.xml><?xml version="1.0" encoding="utf-8"?>
+<p:sld xmlns:a="http://schemas.openxmlformats.org/drawingml/2006/main" xmlns:r="http://schemas.openxmlformats.org/officeDocument/2006/relationships" xmlns:p="http://schemas.openxmlformats.org/presentationml/2006/main">
+  <p:cSld>
+    <p:spTree>
+      <p:nvGrpSpPr>
+        <p:cNvPr id="1" name=""/>
+        <p:cNvGrpSpPr/>
+        <p:nvPr/>
+      </p:nvGrpSpPr>
+      <p:grpSpPr>
+        <a:xfrm>
+          <a:off x="0" y="0"/>
+          <a:ext cx="0" cy="0"/>
+          <a:chOff x="0" y="0"/>
+          <a:chExt cx="0" cy="0"/>
+        </a:xfrm>
+      </p:grpSpPr>
+      <p:pic>
+        <p:nvPicPr>
+          <p:cNvPr id="2" name="Picture 1">
+            <a:extLst>
+              <a:ext uri="{FF2B5EF4-FFF2-40B4-BE49-F238E27FC236}">
+                <a16:creationId xmlns:a16="http://schemas.microsoft.com/office/drawing/2014/main" id="{96204503-0098-6EDA-9021-76A1BBB00201}"/>
+              </a:ext>
+            </a:extLst>
+          </p:cNvPr>
+          <p:cNvPicPr>
+            <a:picLocks noChangeAspect="1"/>
+          </p:cNvPicPr>
+          <p:nvPr/>
+        </p:nvPicPr>
+        <p:blipFill>
+          <a:blip r:embed="rId2">
+            <a:extLst>
+              <a:ext uri="{28A0092B-C50C-407E-A947-70E740481C1C}">
+                <a14:useLocalDpi xmlns:a14="http://schemas.microsoft.com/office/drawing/2010/main" val="0"/>
+              </a:ext>
+            </a:extLst>
+          </a:blip>
+          <a:srcRect/>
+          <a:stretch/>
+        </p:blipFill>
+        <p:spPr>
+          <a:xfrm>
+            <a:off x="3540313" y="2576608"/>
+            <a:ext cx="11207374" cy="8577072"/>
+          </a:xfrm>
+          <a:prstGeom prst="roundRect">
+            <a:avLst>
+              <a:gd name="adj" fmla="val 2231"/>
+            </a:avLst>
+          </a:prstGeom>
+          <a:effectLst>
+            <a:outerShdw blurRad="254000" dist="127000" dir="5400000" algn="t" rotWithShape="0">
+              <a:prstClr val="black">
+                <a:alpha val="10000"/>
+              </a:prstClr>
+            </a:outerShdw>
+          </a:effectLst>
+        </p:spPr>
+      </p:pic>
+      <p:sp>
+        <p:nvSpPr>
+          <p:cNvPr id="3" name="Rectangle 2">
+            <a:extLst>
+              <a:ext uri="{FF2B5EF4-FFF2-40B4-BE49-F238E27FC236}">
+                <a16:creationId xmlns:a16="http://schemas.microsoft.com/office/drawing/2014/main" id="{850B5E49-B075-D076-6B51-5A0E62FC75C1}"/>
+              </a:ext>
+            </a:extLst>
+          </p:cNvPr>
+          <p:cNvSpPr/>
+          <p:nvPr/>
+        </p:nvSpPr>
+        <p:spPr>
+          <a:xfrm>
+            <a:off x="0" y="9183"/>
+            <a:ext cx="18288000" cy="13721105"/>
+          </a:xfrm>
+          <a:prstGeom prst="rect">
+            <a:avLst/>
+          </a:prstGeom>
+          <a:noFill/>
+          <a:ln>
+            <a:noFill/>
+          </a:ln>
+        </p:spPr>
+        <p:style>
+          <a:lnRef idx="2">
+            <a:schemeClr val="accent1">
+              <a:shade val="50000"/>
+            </a:schemeClr>
+          </a:lnRef>
+          <a:fillRef idx="1">
+            <a:schemeClr val="accent1"/>
+          </a:fillRef>
+          <a:effectRef idx="0">
+            <a:schemeClr val="accent1"/>
+          </a:effectRef>
+          <a:fontRef idx="minor">
+            <a:schemeClr val="lt1"/>
+          </a:fontRef>
+        </p:style>
+        <p:txBody>
+          <a:bodyPr rtlCol="0" anchor="ctr"/>
+          <a:lstStyle/>
+          <a:p>
+            <a:pPr algn="ctr"/>
+            <a:endParaRPr lang="en-US"/>
+          </a:p>
+        </p:txBody>
+      </p:sp>
+    </p:spTree>
+    <p:extLst>
+      <p:ext uri="{BB962C8B-B14F-4D97-AF65-F5344CB8AC3E}">
+        <p14:creationId xmlns:p14="http://schemas.microsoft.com/office/powerpoint/2010/main" val="470062537"/>
       </p:ext>
     </p:extLst>
   </p:cSld>

</xml_diff>